<commit_message>
update and add pdf
</commit_message>
<xml_diff>
--- a/docs/RESTful Notification.pptx
+++ b/docs/RESTful Notification.pptx
@@ -14,7 +14,6 @@
     <p:sldId id="265" r:id="rId8"/>
     <p:sldId id="264" r:id="rId9"/>
     <p:sldId id="261" r:id="rId10"/>
-    <p:sldId id="262" r:id="rId11"/>
   </p:sldIdLst>
   <p:sldSz cx="9144000" cy="6858000" type="screen4x3"/>
   <p:notesSz cx="6858000" cy="9144000"/>
@@ -3078,15 +3077,7 @@
           <a:p>
             <a:r>
               <a:rPr lang="en-US"/>
-              <a:t>REST Design Patterns for </a:t>
-            </a:r>
-            <a:r>
-              <a:rPr lang="en-US"/>
-              <a:t>Robust </a:t>
-            </a:r>
-            <a:r>
-              <a:rPr lang="en-US"/>
-              <a:t>Asynchronous Notification </a:t>
+              <a:t>REST Design Patterns for Robust Asynchronous Notification </a:t>
             </a:r>
           </a:p>
         </p:txBody>
@@ -3108,15 +3099,7 @@
           <a:p>
             <a:r>
               <a:rPr lang="en-US"/>
-              <a:t>Using simple observe/notify to build a robust and </a:t>
-            </a:r>
-            <a:r>
-              <a:rPr lang="en-US"/>
-              <a:t>reusable </a:t>
-            </a:r>
-            <a:r>
-              <a:rPr lang="en-US"/>
-              <a:t>design pattern for asynchronous notifications</a:t>
+              <a:t>Using simple observe/notify to build a robust and reusable design pattern for asynchronous notifications</a:t>
             </a:r>
           </a:p>
         </p:txBody>
@@ -3125,80 +3108,6 @@
     <p:extLst>
       <p:ext uri="{BB962C8B-B14F-4D97-AF65-F5344CB8AC3E}">
         <p14:creationId xmlns:p14="http://schemas.microsoft.com/office/powerpoint/2010/main" val="2268591527"/>
-      </p:ext>
-    </p:extLst>
-  </p:cSld>
-  <p:clrMapOvr>
-    <a:masterClrMapping/>
-  </p:clrMapOvr>
-</p:sld>
-</file>
-
-<file path=ppt/slides/slide10.xml><?xml version="1.0" encoding="utf-8"?>
-<p:sld xmlns:a="http://schemas.openxmlformats.org/drawingml/2006/main" xmlns:r="http://schemas.openxmlformats.org/officeDocument/2006/relationships" xmlns:p="http://schemas.openxmlformats.org/presentationml/2006/main">
-  <p:cSld>
-    <p:spTree>
-      <p:nvGrpSpPr>
-        <p:cNvPr id="1" name=""/>
-        <p:cNvGrpSpPr/>
-        <p:nvPr/>
-      </p:nvGrpSpPr>
-      <p:grpSpPr>
-        <a:xfrm>
-          <a:off x="0" y="0"/>
-          <a:ext cx="0" cy="0"/>
-          <a:chOff x="0" y="0"/>
-          <a:chExt cx="0" cy="0"/>
-        </a:xfrm>
-      </p:grpSpPr>
-      <p:sp>
-        <p:nvSpPr>
-          <p:cNvPr id="2" name="Title 1"/>
-          <p:cNvSpPr>
-            <a:spLocks noGrp="1"/>
-          </p:cNvSpPr>
-          <p:nvPr>
-            <p:ph type="title"/>
-          </p:nvPr>
-        </p:nvSpPr>
-        <p:spPr/>
-        <p:txBody>
-          <a:bodyPr/>
-          <a:lstStyle/>
-          <a:p>
-            <a:r>
-              <a:rPr lang="en-US"/>
-              <a:t>Events</a:t>
-            </a:r>
-          </a:p>
-        </p:txBody>
-      </p:sp>
-      <p:sp>
-        <p:nvSpPr>
-          <p:cNvPr id="3" name="Content Placeholder 2"/>
-          <p:cNvSpPr>
-            <a:spLocks noGrp="1"/>
-          </p:cNvSpPr>
-          <p:nvPr>
-            <p:ph idx="1"/>
-          </p:nvPr>
-        </p:nvSpPr>
-        <p:spPr/>
-        <p:txBody>
-          <a:bodyPr/>
-          <a:lstStyle/>
-          <a:p>
-            <a:r>
-              <a:rPr lang="en-US"/>
-              <a:t>Diagram of event instance collection</a:t>
-            </a:r>
-          </a:p>
-        </p:txBody>
-      </p:sp>
-    </p:spTree>
-    <p:extLst>
-      <p:ext uri="{BB962C8B-B14F-4D97-AF65-F5344CB8AC3E}">
-        <p14:creationId xmlns:p14="http://schemas.microsoft.com/office/powerpoint/2010/main" val="4209158742"/>
       </p:ext>
     </p:extLst>
   </p:cSld>
@@ -3259,7 +3168,9 @@
         </p:nvSpPr>
         <p:spPr/>
         <p:txBody>
-          <a:bodyPr/>
+          <a:bodyPr>
+            <a:normAutofit lnSpcReduction="10000"/>
+          </a:bodyPr>
           <a:lstStyle/>
           <a:p>
             <a:r>
@@ -3268,9 +3179,45 @@
             </a:r>
           </a:p>
           <a:p>
+            <a:pPr lvl="1"/>
+            <a:r>
+              <a:rPr lang="en-US"/>
+              <a:t>The list of observers is hidden server state</a:t>
+            </a:r>
+          </a:p>
+          <a:p>
+            <a:pPr lvl="1"/>
+            <a:r>
+              <a:rPr lang="en-US"/>
+              <a:t>Client can't be certain if it is still in the list </a:t>
+            </a:r>
+          </a:p>
+          <a:p>
+            <a:pPr lvl="1"/>
+            <a:r>
+              <a:rPr lang="en-US"/>
+              <a:t>Conditional Observe is difficult to manage</a:t>
+            </a:r>
+            <a:endParaRPr lang="en-US"/>
+          </a:p>
+          <a:p>
             <a:r>
               <a:rPr lang="en-US"/>
               <a:t>Events have life cycle beyond one notification</a:t>
+            </a:r>
+          </a:p>
+          <a:p>
+            <a:pPr lvl="1"/>
+            <a:r>
+              <a:rPr lang="en-US"/>
+              <a:t>Alerts are generated, acknowledged, and eventually cleared</a:t>
+            </a:r>
+          </a:p>
+          <a:p>
+            <a:pPr lvl="1"/>
+            <a:r>
+              <a:rPr lang="en-US"/>
+              <a:t>Use cases for asynchronous Event delivery, polling, and batch Event processing</a:t>
             </a:r>
           </a:p>
         </p:txBody>
@@ -3322,7 +3269,7 @@
           <a:p>
             <a:r>
               <a:rPr lang="en-US"/>
-              <a:t>Patterns</a:t>
+              <a:t>Design Patterns</a:t>
             </a:r>
           </a:p>
         </p:txBody>
@@ -3339,7 +3286,9 @@
         </p:nvSpPr>
         <p:spPr/>
         <p:txBody>
-          <a:bodyPr/>
+          <a:bodyPr>
+            <a:normAutofit/>
+          </a:bodyPr>
           <a:lstStyle/>
           <a:p>
             <a:r>
@@ -3364,7 +3313,14 @@
             <a:pPr lvl="1"/>
             <a:r>
               <a:rPr lang="en-US"/>
-              <a:t>REST resource to represent Event instances</a:t>
+              <a:t>REST resource to represent an Event instance</a:t>
+            </a:r>
+          </a:p>
+          <a:p>
+            <a:pPr lvl="1"/>
+            <a:r>
+              <a:rPr lang="en-US"/>
+              <a:t>Maintain Event instances in an observable collection</a:t>
             </a:r>
           </a:p>
         </p:txBody>
@@ -3438,13 +3394,13 @@
         </p:nvSpPr>
         <p:spPr>
           <a:xfrm>
-            <a:off x="457200" y="1227851"/>
-            <a:ext cx="8229600" cy="5006031"/>
+            <a:off x="457200" y="1227853"/>
+            <a:ext cx="8229600" cy="4876812"/>
           </a:xfrm>
         </p:spPr>
         <p:txBody>
           <a:bodyPr>
-            <a:normAutofit fontScale="85000" lnSpcReduction="10000"/>
+            <a:normAutofit fontScale="77500" lnSpcReduction="20000"/>
           </a:bodyPr>
           <a:lstStyle/>
           <a:p>
@@ -3461,13 +3417,8 @@
             </a:r>
             <a:r>
               <a:rPr lang="en-US"/>
-              <a:t>(</a:t>
-            </a:r>
-            <a:r>
-              <a:rPr lang="en-US"/>
-              <a:t>RFC5989)</a:t>
-            </a:r>
-            <a:endParaRPr lang="en-US"/>
+              <a:t>(RFC5989)</a:t>
+            </a:r>
           </a:p>
           <a:p>
             <a:pPr lvl="1"/>
@@ -3479,13 +3430,19 @@
           <a:p>
             <a:r>
               <a:rPr lang="en-US"/>
-              <a:t>A Monitor may reuse Observe on the server to obtain state changes of the context resource</a:t>
+              <a:t>A Monitor may use Observe on the server to obtain state changes of the context resource</a:t>
             </a:r>
           </a:p>
           <a:p>
             <a:r>
               <a:rPr lang="en-US"/>
               <a:t>A Monitor may implement conditional notification using filter parameters (dynlink) as well as defining transfer methods and formats</a:t>
+            </a:r>
+          </a:p>
+          <a:p>
+            <a:r>
+              <a:rPr lang="en-US"/>
+              <a:t>Monitor parameters may be encoded as link attributes or stored in a monitor configuration resource</a:t>
             </a:r>
           </a:p>
           <a:p>
@@ -4241,7 +4198,6 @@
               <a:rPr lang="en-US"/>
               <a:t>accept-interface</a:t>
             </a:r>
-            <a:endParaRPr lang="en-US"/>
           </a:p>
         </p:txBody>
       </p:sp>
@@ -6287,10 +6243,6 @@
               </a:rPr>
               <a:t>&lt;&gt;;anchor=A;rel=monitor</a:t>
             </a:r>
-            <a:endParaRPr lang="en-US">
-              <a:latin typeface="Courier"/>
-              <a:cs typeface="Courier"/>
-            </a:endParaRPr>
           </a:p>
         </p:txBody>
       </p:sp>
@@ -6582,7 +6534,6 @@
               <a:rPr lang="en-US" sz="2000" b="1"/>
               <a:t>B Observes State From A</a:t>
             </a:r>
-            <a:endParaRPr lang="en-US" sz="2000" b="1"/>
           </a:p>
         </p:txBody>
       </p:sp>
@@ -6839,21 +6790,7 @@
                 <a:latin typeface="Courier"/>
                 <a:cs typeface="Courier"/>
               </a:rPr>
-              <a:t>  </a:t>
-            </a:r>
-            <a:r>
-              <a:rPr lang="en-US" sz="2000">
-                <a:latin typeface="Courier"/>
-                <a:cs typeface="Courier"/>
-              </a:rPr>
-              <a:t>"rel": "monitor",</a:t>
-            </a:r>
-            <a:r>
-              <a:rPr lang="en-US" sz="2000">
-                <a:latin typeface="Courier"/>
-                <a:cs typeface="Courier"/>
-              </a:rPr>
-              <a:t> </a:t>
+              <a:t>  "rel": "monitor", </a:t>
             </a:r>
           </a:p>
           <a:p>
@@ -6877,19 +6814,8 @@
                 <a:latin typeface="Courier"/>
                 <a:cs typeface="Courier"/>
               </a:rPr>
-              <a:t>}</a:t>
-            </a:r>
-            <a:r>
-              <a:rPr lang="en-US" sz="2000">
-                <a:latin typeface="Courier"/>
-                <a:cs typeface="Courier"/>
-              </a:rPr>
-              <a:t> </a:t>
-            </a:r>
-            <a:endParaRPr lang="en-US" sz="2000">
-              <a:latin typeface="Courier"/>
-              <a:cs typeface="Courier"/>
-            </a:endParaRPr>
+              <a:t>} </a:t>
+            </a:r>
           </a:p>
         </p:txBody>
       </p:sp>
@@ -7092,21 +7018,7 @@
                 <a:latin typeface="Courier"/>
                 <a:cs typeface="Courier"/>
               </a:rPr>
-              <a:t>  </a:t>
-            </a:r>
-            <a:r>
-              <a:rPr lang="en-US" sz="2000">
-                <a:latin typeface="Courier"/>
-                <a:cs typeface="Courier"/>
-              </a:rPr>
-              <a:t>"rel": "monitor",</a:t>
-            </a:r>
-            <a:r>
-              <a:rPr lang="en-US" sz="2000">
-                <a:latin typeface="Courier"/>
-                <a:cs typeface="Courier"/>
-              </a:rPr>
-              <a:t> </a:t>
+              <a:t>  "rel": "monitor", </a:t>
             </a:r>
           </a:p>
           <a:p>
@@ -7130,19 +7042,8 @@
                 <a:latin typeface="Courier"/>
                 <a:cs typeface="Courier"/>
               </a:rPr>
-              <a:t>}</a:t>
-            </a:r>
-            <a:r>
-              <a:rPr lang="en-US" sz="2000">
-                <a:latin typeface="Courier"/>
-                <a:cs typeface="Courier"/>
-              </a:rPr>
-              <a:t> </a:t>
-            </a:r>
-            <a:endParaRPr lang="en-US" sz="2000">
-              <a:latin typeface="Courier"/>
-              <a:cs typeface="Courier"/>
-            </a:endParaRPr>
+              <a:t>} </a:t>
+            </a:r>
           </a:p>
         </p:txBody>
       </p:sp>
@@ -7211,7 +7112,7 @@
         <p:spPr/>
         <p:txBody>
           <a:bodyPr>
-            <a:normAutofit lnSpcReduction="10000"/>
+            <a:normAutofit fontScale="92500"/>
           </a:bodyPr>
           <a:lstStyle/>
           <a:p>
@@ -7229,7 +7130,7 @@
           <a:p>
             <a:r>
               <a:rPr lang="en-US"/>
-              <a:t>Monitor may add state change notifications to a collection of Event instances using CREATE</a:t>
+              <a:t>A monitor may add state change notifications to a collection of Event instances using CREATE</a:t>
             </a:r>
           </a:p>
           <a:p>

</xml_diff>

<commit_message>
update RESTful notification slides
</commit_message>
<xml_diff>
--- a/docs/RESTful Notification.pptx
+++ b/docs/RESTful Notification.pptx
@@ -14,6 +14,7 @@
     <p:sldId id="265" r:id="rId8"/>
     <p:sldId id="264" r:id="rId9"/>
     <p:sldId id="261" r:id="rId10"/>
+    <p:sldId id="266" r:id="rId11"/>
   </p:sldIdLst>
   <p:sldSz cx="9144000" cy="6858000" type="screen4x3"/>
   <p:notesSz cx="6858000" cy="9144000"/>
@@ -3117,6 +3118,203 @@
 </p:sld>
 </file>
 
+<file path=ppt/slides/slide10.xml><?xml version="1.0" encoding="utf-8"?>
+<p:sld xmlns:a="http://schemas.openxmlformats.org/drawingml/2006/main" xmlns:r="http://schemas.openxmlformats.org/officeDocument/2006/relationships" xmlns:p="http://schemas.openxmlformats.org/presentationml/2006/main">
+  <p:cSld>
+    <p:spTree>
+      <p:nvGrpSpPr>
+        <p:cNvPr id="1" name=""/>
+        <p:cNvGrpSpPr/>
+        <p:nvPr/>
+      </p:nvGrpSpPr>
+      <p:grpSpPr>
+        <a:xfrm>
+          <a:off x="0" y="0"/>
+          <a:ext cx="0" cy="0"/>
+          <a:chOff x="0" y="0"/>
+          <a:chExt cx="0" cy="0"/>
+        </a:xfrm>
+      </p:grpSpPr>
+      <p:sp>
+        <p:nvSpPr>
+          <p:cNvPr id="2" name="Title 1"/>
+          <p:cNvSpPr>
+            <a:spLocks noGrp="1"/>
+          </p:cNvSpPr>
+          <p:nvPr>
+            <p:ph type="title"/>
+          </p:nvPr>
+        </p:nvSpPr>
+        <p:spPr/>
+        <p:txBody>
+          <a:bodyPr/>
+          <a:lstStyle/>
+          <a:p>
+            <a:r>
+              <a:rPr lang="en-US"/>
+              <a:t>Monitor Link to Event Collection</a:t>
+            </a:r>
+          </a:p>
+        </p:txBody>
+      </p:sp>
+      <p:sp>
+        <p:nvSpPr>
+          <p:cNvPr id="4" name="Rectangle 3"/>
+          <p:cNvSpPr/>
+          <p:nvPr/>
+        </p:nvSpPr>
+        <p:spPr>
+          <a:xfrm>
+            <a:off x="726254" y="1555565"/>
+            <a:ext cx="7350992" cy="4401205"/>
+          </a:xfrm>
+          <a:prstGeom prst="rect">
+            <a:avLst/>
+          </a:prstGeom>
+        </p:spPr>
+        <p:txBody>
+          <a:bodyPr wrap="square">
+            <a:spAutoFit/>
+          </a:bodyPr>
+          <a:lstStyle/>
+          <a:p>
+            <a:r>
+              <a:rPr lang="en-US" sz="2000">
+                <a:latin typeface="Courier"/>
+                <a:cs typeface="Courier"/>
+              </a:rPr>
+              <a:t>Create new event instances when events occur</a:t>
+            </a:r>
+          </a:p>
+          <a:p>
+            <a:r>
+              <a:rPr lang="en-US" sz="2000">
+                <a:latin typeface="Courier"/>
+                <a:cs typeface="Courier"/>
+              </a:rPr>
+              <a:t>{</a:t>
+            </a:r>
+          </a:p>
+          <a:p>
+            <a:r>
+              <a:rPr lang="en-US" sz="2000">
+                <a:latin typeface="Courier"/>
+                <a:cs typeface="Courier"/>
+              </a:rPr>
+              <a:t>  "anchor": "/example/resource/event-emitter",</a:t>
+            </a:r>
+          </a:p>
+          <a:p>
+            <a:r>
+              <a:rPr lang="en-US" sz="2000">
+                <a:latin typeface="Courier"/>
+                <a:cs typeface="Courier"/>
+              </a:rPr>
+              <a:t>  "rel": "monitor",</a:t>
+            </a:r>
+          </a:p>
+          <a:p>
+            <a:r>
+              <a:rPr lang="en-US" sz="2000">
+                <a:latin typeface="Courier"/>
+                <a:cs typeface="Courier"/>
+              </a:rPr>
+              <a:t>  "href": "events",</a:t>
+            </a:r>
+          </a:p>
+          <a:p>
+            <a:r>
+              <a:rPr lang="en-US" sz="2000">
+                <a:latin typeface="Courier"/>
+                <a:cs typeface="Courier"/>
+              </a:rPr>
+              <a:t>  "target-method": "create"</a:t>
+            </a:r>
+          </a:p>
+          <a:p>
+            <a:r>
+              <a:rPr lang="en-US" sz="2000">
+                <a:latin typeface="Courier"/>
+                <a:cs typeface="Courier"/>
+              </a:rPr>
+              <a:t>}</a:t>
+            </a:r>
+          </a:p>
+          <a:p>
+            <a:endParaRPr lang="en-US" sz="2000">
+              <a:latin typeface="Courier"/>
+              <a:cs typeface="Courier"/>
+            </a:endParaRPr>
+          </a:p>
+          <a:p>
+            <a:r>
+              <a:rPr lang="en-US" sz="2000">
+                <a:latin typeface="Courier"/>
+                <a:cs typeface="Courier"/>
+              </a:rPr>
+              <a:t>Push event notifications to a MQTT topic</a:t>
+            </a:r>
+          </a:p>
+          <a:p>
+            <a:r>
+              <a:rPr lang="en-US" sz="2000">
+                <a:latin typeface="Courier"/>
+                <a:cs typeface="Courier"/>
+              </a:rPr>
+              <a:t>{</a:t>
+            </a:r>
+          </a:p>
+          <a:p>
+            <a:r>
+              <a:rPr lang="en-US" sz="2000">
+                <a:latin typeface="Courier"/>
+                <a:cs typeface="Courier"/>
+              </a:rPr>
+              <a:t>  "anchor": "events",</a:t>
+            </a:r>
+          </a:p>
+          <a:p>
+            <a:r>
+              <a:rPr lang="en-US" sz="2000">
+                <a:latin typeface="Courier"/>
+                <a:cs typeface="Courier"/>
+              </a:rPr>
+              <a:t>  "rel": "monitor",</a:t>
+            </a:r>
+          </a:p>
+          <a:p>
+            <a:r>
+              <a:rPr lang="en-US" sz="2000">
+                <a:latin typeface="Courier"/>
+                <a:cs typeface="Courier"/>
+              </a:rPr>
+              <a:t>  "href": "mqtt://0m2m.net/example/topic"</a:t>
+            </a:r>
+          </a:p>
+          <a:p>
+            <a:r>
+              <a:rPr lang="en-US" sz="2000">
+                <a:latin typeface="Courier"/>
+                <a:cs typeface="Courier"/>
+              </a:rPr>
+              <a:t>{</a:t>
+            </a:r>
+          </a:p>
+        </p:txBody>
+      </p:sp>
+    </p:spTree>
+    <p:extLst>
+      <p:ext uri="{BB962C8B-B14F-4D97-AF65-F5344CB8AC3E}">
+        <p14:creationId xmlns:p14="http://schemas.microsoft.com/office/powerpoint/2010/main" val="228129838"/>
+      </p:ext>
+    </p:extLst>
+  </p:cSld>
+  <p:clrMapOvr>
+    <a:masterClrMapping/>
+  </p:clrMapOvr>
+</p:sld>
+</file>
+
 <file path=ppt/slides/slide2.xml><?xml version="1.0" encoding="utf-8"?>
 <p:sld xmlns:a="http://schemas.openxmlformats.org/drawingml/2006/main" xmlns:r="http://schemas.openxmlformats.org/officeDocument/2006/relationships" xmlns:p="http://schemas.openxmlformats.org/presentationml/2006/main">
   <p:cSld>
@@ -7119,7 +7317,7 @@
           <a:p>
             <a:r>
               <a:rPr lang="en-US"/>
-              <a:t>Events have a life cycle, like log records, alerts, etc.</a:t>
+              <a:t>Events may have a life cycle, like log records, alerts, etc.</a:t>
             </a:r>
           </a:p>
           <a:p>

</xml_diff>